<commit_message>
Add images to tutorial.
</commit_message>
<xml_diff>
--- a/tutorial/Nomad Bootcamp.pptx
+++ b/tutorial/Nomad Bootcamp.pptx
@@ -792,7 +792,7 @@
           <a:bodyPr/>
           <a:lstStyle/>
           <a:p>
-            <a:fld id="{B9AB83B5-296D-4126-8B45-4FCD773400CF}" type="datetimeFigureOut">
+            <a:fld id="{0089D95D-7EAC-4BA7-A275-A02DACE25243}" type="datetime1">
               <a:rPr lang="en-US" smtClean="0"/>
               <a:t>3/11/2019</a:t>
             </a:fld>
@@ -990,7 +990,7 @@
           <a:bodyPr/>
           <a:lstStyle/>
           <a:p>
-            <a:fld id="{B9AB83B5-296D-4126-8B45-4FCD773400CF}" type="datetimeFigureOut">
+            <a:fld id="{6D3B48B5-F254-4FC5-8CB6-F7262C665025}" type="datetime1">
               <a:rPr lang="en-US" smtClean="0"/>
               <a:t>3/11/2019</a:t>
             </a:fld>
@@ -1198,7 +1198,7 @@
           <a:bodyPr/>
           <a:lstStyle/>
           <a:p>
-            <a:fld id="{B9AB83B5-296D-4126-8B45-4FCD773400CF}" type="datetimeFigureOut">
+            <a:fld id="{A08FFE4B-4226-43F9-B02D-A30F5787A97F}" type="datetime1">
               <a:rPr lang="en-US" smtClean="0"/>
               <a:t>3/11/2019</a:t>
             </a:fld>
@@ -1396,7 +1396,7 @@
           <a:bodyPr/>
           <a:lstStyle/>
           <a:p>
-            <a:fld id="{B9AB83B5-296D-4126-8B45-4FCD773400CF}" type="datetimeFigureOut">
+            <a:fld id="{C016C0B4-3068-4C5C-8BC4-94242F21AAE1}" type="datetime1">
               <a:rPr lang="en-US" smtClean="0"/>
               <a:t>3/11/2019</a:t>
             </a:fld>
@@ -1671,7 +1671,7 @@
           <a:bodyPr/>
           <a:lstStyle/>
           <a:p>
-            <a:fld id="{B9AB83B5-296D-4126-8B45-4FCD773400CF}" type="datetimeFigureOut">
+            <a:fld id="{2B236932-912E-4E90-A90C-C90008504E3B}" type="datetime1">
               <a:rPr lang="en-US" smtClean="0"/>
               <a:t>3/11/2019</a:t>
             </a:fld>
@@ -1936,7 +1936,7 @@
           <a:bodyPr/>
           <a:lstStyle/>
           <a:p>
-            <a:fld id="{B9AB83B5-296D-4126-8B45-4FCD773400CF}" type="datetimeFigureOut">
+            <a:fld id="{1241A6D3-A591-4F34-9ABC-359621D67319}" type="datetime1">
               <a:rPr lang="en-US" smtClean="0"/>
               <a:t>3/11/2019</a:t>
             </a:fld>
@@ -2348,7 +2348,7 @@
           <a:bodyPr/>
           <a:lstStyle/>
           <a:p>
-            <a:fld id="{B9AB83B5-296D-4126-8B45-4FCD773400CF}" type="datetimeFigureOut">
+            <a:fld id="{7E6C2495-4C0F-470D-B1C4-83B4E15ADBC9}" type="datetime1">
               <a:rPr lang="en-US" smtClean="0"/>
               <a:t>3/11/2019</a:t>
             </a:fld>
@@ -2489,7 +2489,7 @@
           <a:bodyPr/>
           <a:lstStyle/>
           <a:p>
-            <a:fld id="{B9AB83B5-296D-4126-8B45-4FCD773400CF}" type="datetimeFigureOut">
+            <a:fld id="{25599FAA-EA32-48A7-9C81-842DF4AD9D37}" type="datetime1">
               <a:rPr lang="en-US" smtClean="0"/>
               <a:t>3/11/2019</a:t>
             </a:fld>
@@ -2602,7 +2602,7 @@
           <a:bodyPr/>
           <a:lstStyle/>
           <a:p>
-            <a:fld id="{B9AB83B5-296D-4126-8B45-4FCD773400CF}" type="datetimeFigureOut">
+            <a:fld id="{9765FF4D-F339-4874-AF4C-5F90C48AAC05}" type="datetime1">
               <a:rPr lang="en-US" smtClean="0"/>
               <a:t>3/11/2019</a:t>
             </a:fld>
@@ -2913,7 +2913,7 @@
           <a:bodyPr/>
           <a:lstStyle/>
           <a:p>
-            <a:fld id="{B9AB83B5-296D-4126-8B45-4FCD773400CF}" type="datetimeFigureOut">
+            <a:fld id="{555C94FC-4ABA-4182-994A-621730632065}" type="datetime1">
               <a:rPr lang="en-US" smtClean="0"/>
               <a:t>3/11/2019</a:t>
             </a:fld>
@@ -3201,7 +3201,7 @@
           <a:bodyPr/>
           <a:lstStyle/>
           <a:p>
-            <a:fld id="{B9AB83B5-296D-4126-8B45-4FCD773400CF}" type="datetimeFigureOut">
+            <a:fld id="{F132F570-70EF-4715-9D66-78E7EA05F514}" type="datetime1">
               <a:rPr lang="en-US" smtClean="0"/>
               <a:t>3/11/2019</a:t>
             </a:fld>
@@ -3442,7 +3442,7 @@
             </a:lvl1pPr>
           </a:lstStyle>
           <a:p>
-            <a:fld id="{B9AB83B5-296D-4126-8B45-4FCD773400CF}" type="datetimeFigureOut">
+            <a:fld id="{45B93F35-AED6-493B-AACC-26552E6D5A0B}" type="datetime1">
               <a:rPr lang="en-US" smtClean="0"/>
               <a:t>3/11/2019</a:t>
             </a:fld>
@@ -3561,6 +3561,7 @@
     <p:sldLayoutId id="2147483658" r:id="rId10"/>
     <p:sldLayoutId id="2147483659" r:id="rId11"/>
   </p:sldLayoutIdLst>
+  <p:hf hdr="0" ftr="0" dt="0"/>
   <p:txStyles>
     <p:titleStyle>
       <a:lvl1pPr algn="l" defTabSz="914400" rtl="0" eaLnBrk="1" latinLnBrk="0" hangingPunct="1">
@@ -4240,6 +4241,35 @@
           </a:p>
         </p:txBody>
       </p:sp>
+      <p:sp>
+        <p:nvSpPr>
+          <p:cNvPr id="4" name="Slide Number Placeholder 3">
+            <a:extLst>
+              <a:ext uri="{FF2B5EF4-FFF2-40B4-BE49-F238E27FC236}">
+                <a16:creationId xmlns:a16="http://schemas.microsoft.com/office/drawing/2014/main" id="{C8B908B8-AFB1-4261-B26C-84FFEA65FDA2}"/>
+              </a:ext>
+            </a:extLst>
+          </p:cNvPr>
+          <p:cNvSpPr>
+            <a:spLocks noGrp="1"/>
+          </p:cNvSpPr>
+          <p:nvPr>
+            <p:ph type="sldNum" sz="quarter" idx="12"/>
+          </p:nvPr>
+        </p:nvSpPr>
+        <p:spPr/>
+        <p:txBody>
+          <a:bodyPr/>
+          <a:lstStyle/>
+          <a:p>
+            <a:fld id="{298EC0E5-27BB-4B98-A049-4ABBDEC963D6}" type="slidenum">
+              <a:rPr lang="en-US" smtClean="0"/>
+              <a:t>1</a:t>
+            </a:fld>
+            <a:endParaRPr lang="en-US"/>
+          </a:p>
+        </p:txBody>
+      </p:sp>
     </p:spTree>
     <p:extLst>
       <p:ext uri="{BB962C8B-B14F-4D97-AF65-F5344CB8AC3E}">
@@ -4314,7 +4344,12 @@
             <p:ph idx="1"/>
           </p:nvPr>
         </p:nvSpPr>
-        <p:spPr/>
+        <p:spPr>
+          <a:xfrm>
+            <a:off x="838200" y="5864211"/>
+            <a:ext cx="10515600" cy="526978"/>
+          </a:xfrm>
+        </p:spPr>
         <p:txBody>
           <a:bodyPr>
             <a:normAutofit/>
@@ -4334,6 +4369,1079 @@
           </a:p>
           <a:p>
             <a:endParaRPr lang="en-US" sz="2400" dirty="0"/>
+          </a:p>
+        </p:txBody>
+      </p:sp>
+      <p:sp>
+        <p:nvSpPr>
+          <p:cNvPr id="3" name="Slide Number Placeholder 2">
+            <a:extLst>
+              <a:ext uri="{FF2B5EF4-FFF2-40B4-BE49-F238E27FC236}">
+                <a16:creationId xmlns:a16="http://schemas.microsoft.com/office/drawing/2014/main" id="{C450A441-683A-46AB-91BC-4EA951A94E93}"/>
+              </a:ext>
+            </a:extLst>
+          </p:cNvPr>
+          <p:cNvSpPr>
+            <a:spLocks noGrp="1"/>
+          </p:cNvSpPr>
+          <p:nvPr>
+            <p:ph type="sldNum" sz="quarter" idx="12"/>
+          </p:nvPr>
+        </p:nvSpPr>
+        <p:spPr/>
+        <p:txBody>
+          <a:bodyPr/>
+          <a:lstStyle/>
+          <a:p>
+            <a:fld id="{298EC0E5-27BB-4B98-A049-4ABBDEC963D6}" type="slidenum">
+              <a:rPr lang="en-US" smtClean="0"/>
+              <a:t>10</a:t>
+            </a:fld>
+            <a:endParaRPr lang="en-US"/>
+          </a:p>
+        </p:txBody>
+      </p:sp>
+      <p:cxnSp>
+        <p:nvCxnSpPr>
+          <p:cNvPr id="6" name="Straight Arrow Connector 5">
+            <a:extLst>
+              <a:ext uri="{FF2B5EF4-FFF2-40B4-BE49-F238E27FC236}">
+                <a16:creationId xmlns:a16="http://schemas.microsoft.com/office/drawing/2014/main" id="{8BC5D42B-F1C7-4FD9-8D3F-08D114E15E0F}"/>
+              </a:ext>
+            </a:extLst>
+          </p:cNvPr>
+          <p:cNvCxnSpPr>
+            <a:cxnSpLocks/>
+            <a:stCxn id="13" idx="3"/>
+            <a:endCxn id="14" idx="1"/>
+          </p:cNvCxnSpPr>
+          <p:nvPr/>
+        </p:nvCxnSpPr>
+        <p:spPr>
+          <a:xfrm flipV="1">
+            <a:off x="3764943" y="2528692"/>
+            <a:ext cx="1167431" cy="2921"/>
+          </a:xfrm>
+          <a:prstGeom prst="straightConnector1">
+            <a:avLst/>
+          </a:prstGeom>
+          <a:noFill/>
+          <a:ln w="123825" cap="flat" cmpd="sng" algn="ctr">
+            <a:solidFill>
+              <a:srgbClr val="E74C25"/>
+            </a:solidFill>
+            <a:prstDash val="solid"/>
+            <a:miter lim="800000"/>
+            <a:tailEnd type="triangle"/>
+          </a:ln>
+          <a:effectLst/>
+        </p:spPr>
+      </p:cxnSp>
+      <p:cxnSp>
+        <p:nvCxnSpPr>
+          <p:cNvPr id="7" name="Straight Arrow Connector 6">
+            <a:extLst>
+              <a:ext uri="{FF2B5EF4-FFF2-40B4-BE49-F238E27FC236}">
+                <a16:creationId xmlns:a16="http://schemas.microsoft.com/office/drawing/2014/main" id="{A0C240F6-EB28-410A-B5D9-D1F7DE8CE883}"/>
+              </a:ext>
+            </a:extLst>
+          </p:cNvPr>
+          <p:cNvCxnSpPr>
+            <a:cxnSpLocks/>
+            <a:stCxn id="14" idx="3"/>
+            <a:endCxn id="15" idx="1"/>
+          </p:cNvCxnSpPr>
+          <p:nvPr/>
+        </p:nvCxnSpPr>
+        <p:spPr>
+          <a:xfrm>
+            <a:off x="6712084" y="2528692"/>
+            <a:ext cx="1339405" cy="0"/>
+          </a:xfrm>
+          <a:prstGeom prst="straightConnector1">
+            <a:avLst/>
+          </a:prstGeom>
+          <a:noFill/>
+          <a:ln w="123825" cap="flat" cmpd="sng" algn="ctr">
+            <a:solidFill>
+              <a:srgbClr val="E74C25"/>
+            </a:solidFill>
+            <a:prstDash val="solid"/>
+            <a:miter lim="800000"/>
+            <a:tailEnd type="triangle"/>
+          </a:ln>
+          <a:effectLst/>
+        </p:spPr>
+      </p:cxnSp>
+      <p:sp>
+        <p:nvSpPr>
+          <p:cNvPr id="13" name="Rectangle 12">
+            <a:extLst>
+              <a:ext uri="{FF2B5EF4-FFF2-40B4-BE49-F238E27FC236}">
+                <a16:creationId xmlns:a16="http://schemas.microsoft.com/office/drawing/2014/main" id="{BC380429-0D09-4BDD-8D1C-E21E46A9EEE7}"/>
+              </a:ext>
+            </a:extLst>
+          </p:cNvPr>
+          <p:cNvSpPr/>
+          <p:nvPr/>
+        </p:nvSpPr>
+        <p:spPr>
+          <a:xfrm>
+            <a:off x="1985233" y="1909425"/>
+            <a:ext cx="1779710" cy="1244376"/>
+          </a:xfrm>
+          <a:prstGeom prst="rect">
+            <a:avLst/>
+          </a:prstGeom>
+          <a:solidFill>
+            <a:schemeClr val="accent5">
+              <a:lumMod val="20000"/>
+              <a:lumOff val="80000"/>
+            </a:schemeClr>
+          </a:solidFill>
+          <a:ln w="28575" cap="flat" cmpd="sng" algn="ctr">
+            <a:solidFill>
+              <a:schemeClr val="tx2"/>
+            </a:solidFill>
+            <a:prstDash val="solid"/>
+            <a:miter lim="800000"/>
+          </a:ln>
+          <a:effectLst/>
+        </p:spPr>
+        <p:txBody>
+          <a:bodyPr rtlCol="0" anchor="ctr"/>
+          <a:lstStyle>
+            <a:defPPr marR="0" lvl="0" algn="l" rtl="0">
+              <a:lnSpc>
+                <a:spcPct val="100000"/>
+              </a:lnSpc>
+              <a:spcBef>
+                <a:spcPts val="0"/>
+              </a:spcBef>
+              <a:spcAft>
+                <a:spcPts val="0"/>
+              </a:spcAft>
+            </a:defPPr>
+            <a:lvl1pPr marR="0" lvl="0" algn="l" rtl="0">
+              <a:lnSpc>
+                <a:spcPct val="100000"/>
+              </a:lnSpc>
+              <a:spcBef>
+                <a:spcPts val="0"/>
+              </a:spcBef>
+              <a:spcAft>
+                <a:spcPts val="0"/>
+              </a:spcAft>
+              <a:buClr>
+                <a:srgbClr val="000000"/>
+              </a:buClr>
+              <a:buFont typeface="Arial"/>
+              <a:defRPr sz="1400" b="0" i="0" u="none" strike="noStrike" cap="none">
+                <a:solidFill>
+                  <a:srgbClr val="000000"/>
+                </a:solidFill>
+                <a:latin typeface="Arial"/>
+                <a:ea typeface="Arial"/>
+                <a:cs typeface="Arial"/>
+                <a:sym typeface="Arial"/>
+              </a:defRPr>
+            </a:lvl1pPr>
+            <a:lvl2pPr marR="0" lvl="1" algn="l" rtl="0">
+              <a:lnSpc>
+                <a:spcPct val="100000"/>
+              </a:lnSpc>
+              <a:spcBef>
+                <a:spcPts val="0"/>
+              </a:spcBef>
+              <a:spcAft>
+                <a:spcPts val="0"/>
+              </a:spcAft>
+              <a:buClr>
+                <a:srgbClr val="000000"/>
+              </a:buClr>
+              <a:buFont typeface="Arial"/>
+              <a:defRPr sz="1400" b="0" i="0" u="none" strike="noStrike" cap="none">
+                <a:solidFill>
+                  <a:srgbClr val="000000"/>
+                </a:solidFill>
+                <a:latin typeface="Arial"/>
+                <a:ea typeface="Arial"/>
+                <a:cs typeface="Arial"/>
+                <a:sym typeface="Arial"/>
+              </a:defRPr>
+            </a:lvl2pPr>
+            <a:lvl3pPr marR="0" lvl="2" algn="l" rtl="0">
+              <a:lnSpc>
+                <a:spcPct val="100000"/>
+              </a:lnSpc>
+              <a:spcBef>
+                <a:spcPts val="0"/>
+              </a:spcBef>
+              <a:spcAft>
+                <a:spcPts val="0"/>
+              </a:spcAft>
+              <a:buClr>
+                <a:srgbClr val="000000"/>
+              </a:buClr>
+              <a:buFont typeface="Arial"/>
+              <a:defRPr sz="1400" b="0" i="0" u="none" strike="noStrike" cap="none">
+                <a:solidFill>
+                  <a:srgbClr val="000000"/>
+                </a:solidFill>
+                <a:latin typeface="Arial"/>
+                <a:ea typeface="Arial"/>
+                <a:cs typeface="Arial"/>
+                <a:sym typeface="Arial"/>
+              </a:defRPr>
+            </a:lvl3pPr>
+            <a:lvl4pPr marR="0" lvl="3" algn="l" rtl="0">
+              <a:lnSpc>
+                <a:spcPct val="100000"/>
+              </a:lnSpc>
+              <a:spcBef>
+                <a:spcPts val="0"/>
+              </a:spcBef>
+              <a:spcAft>
+                <a:spcPts val="0"/>
+              </a:spcAft>
+              <a:buClr>
+                <a:srgbClr val="000000"/>
+              </a:buClr>
+              <a:buFont typeface="Arial"/>
+              <a:defRPr sz="1400" b="0" i="0" u="none" strike="noStrike" cap="none">
+                <a:solidFill>
+                  <a:srgbClr val="000000"/>
+                </a:solidFill>
+                <a:latin typeface="Arial"/>
+                <a:ea typeface="Arial"/>
+                <a:cs typeface="Arial"/>
+                <a:sym typeface="Arial"/>
+              </a:defRPr>
+            </a:lvl4pPr>
+            <a:lvl5pPr marR="0" lvl="4" algn="l" rtl="0">
+              <a:lnSpc>
+                <a:spcPct val="100000"/>
+              </a:lnSpc>
+              <a:spcBef>
+                <a:spcPts val="0"/>
+              </a:spcBef>
+              <a:spcAft>
+                <a:spcPts val="0"/>
+              </a:spcAft>
+              <a:buClr>
+                <a:srgbClr val="000000"/>
+              </a:buClr>
+              <a:buFont typeface="Arial"/>
+              <a:defRPr sz="1400" b="0" i="0" u="none" strike="noStrike" cap="none">
+                <a:solidFill>
+                  <a:srgbClr val="000000"/>
+                </a:solidFill>
+                <a:latin typeface="Arial"/>
+                <a:ea typeface="Arial"/>
+                <a:cs typeface="Arial"/>
+                <a:sym typeface="Arial"/>
+              </a:defRPr>
+            </a:lvl5pPr>
+            <a:lvl6pPr marR="0" lvl="5" algn="l" rtl="0">
+              <a:lnSpc>
+                <a:spcPct val="100000"/>
+              </a:lnSpc>
+              <a:spcBef>
+                <a:spcPts val="0"/>
+              </a:spcBef>
+              <a:spcAft>
+                <a:spcPts val="0"/>
+              </a:spcAft>
+              <a:buClr>
+                <a:srgbClr val="000000"/>
+              </a:buClr>
+              <a:buFont typeface="Arial"/>
+              <a:defRPr sz="1400" b="0" i="0" u="none" strike="noStrike" cap="none">
+                <a:solidFill>
+                  <a:srgbClr val="000000"/>
+                </a:solidFill>
+                <a:latin typeface="Arial"/>
+                <a:ea typeface="Arial"/>
+                <a:cs typeface="Arial"/>
+                <a:sym typeface="Arial"/>
+              </a:defRPr>
+            </a:lvl6pPr>
+            <a:lvl7pPr marR="0" lvl="6" algn="l" rtl="0">
+              <a:lnSpc>
+                <a:spcPct val="100000"/>
+              </a:lnSpc>
+              <a:spcBef>
+                <a:spcPts val="0"/>
+              </a:spcBef>
+              <a:spcAft>
+                <a:spcPts val="0"/>
+              </a:spcAft>
+              <a:buClr>
+                <a:srgbClr val="000000"/>
+              </a:buClr>
+              <a:buFont typeface="Arial"/>
+              <a:defRPr sz="1400" b="0" i="0" u="none" strike="noStrike" cap="none">
+                <a:solidFill>
+                  <a:srgbClr val="000000"/>
+                </a:solidFill>
+                <a:latin typeface="Arial"/>
+                <a:ea typeface="Arial"/>
+                <a:cs typeface="Arial"/>
+                <a:sym typeface="Arial"/>
+              </a:defRPr>
+            </a:lvl7pPr>
+            <a:lvl8pPr marR="0" lvl="7" algn="l" rtl="0">
+              <a:lnSpc>
+                <a:spcPct val="100000"/>
+              </a:lnSpc>
+              <a:spcBef>
+                <a:spcPts val="0"/>
+              </a:spcBef>
+              <a:spcAft>
+                <a:spcPts val="0"/>
+              </a:spcAft>
+              <a:buClr>
+                <a:srgbClr val="000000"/>
+              </a:buClr>
+              <a:buFont typeface="Arial"/>
+              <a:defRPr sz="1400" b="0" i="0" u="none" strike="noStrike" cap="none">
+                <a:solidFill>
+                  <a:srgbClr val="000000"/>
+                </a:solidFill>
+                <a:latin typeface="Arial"/>
+                <a:ea typeface="Arial"/>
+                <a:cs typeface="Arial"/>
+                <a:sym typeface="Arial"/>
+              </a:defRPr>
+            </a:lvl8pPr>
+            <a:lvl9pPr marR="0" lvl="8" algn="l" rtl="0">
+              <a:lnSpc>
+                <a:spcPct val="100000"/>
+              </a:lnSpc>
+              <a:spcBef>
+                <a:spcPts val="0"/>
+              </a:spcBef>
+              <a:spcAft>
+                <a:spcPts val="0"/>
+              </a:spcAft>
+              <a:buClr>
+                <a:srgbClr val="000000"/>
+              </a:buClr>
+              <a:buFont typeface="Arial"/>
+              <a:defRPr sz="1400" b="0" i="0" u="none" strike="noStrike" cap="none">
+                <a:solidFill>
+                  <a:srgbClr val="000000"/>
+                </a:solidFill>
+                <a:latin typeface="Arial"/>
+                <a:ea typeface="Arial"/>
+                <a:cs typeface="Arial"/>
+                <a:sym typeface="Arial"/>
+              </a:defRPr>
+            </a:lvl9pPr>
+          </a:lstStyle>
+          <a:p>
+            <a:pPr marL="0" marR="0" lvl="0" indent="0" algn="ctr" defTabSz="457200" eaLnBrk="1" fontAlgn="auto" latinLnBrk="0" hangingPunct="1">
+              <a:lnSpc>
+                <a:spcPct val="100000"/>
+              </a:lnSpc>
+              <a:spcBef>
+                <a:spcPts val="0"/>
+              </a:spcBef>
+              <a:spcAft>
+                <a:spcPts val="0"/>
+              </a:spcAft>
+              <a:buClrTx/>
+              <a:buSzTx/>
+              <a:buFontTx/>
+              <a:buNone/>
+              <a:tabLst/>
+              <a:defRPr/>
+            </a:pPr>
+            <a:r>
+              <a:rPr kumimoji="0" lang="en-US" sz="1600" b="1" i="0" u="none" strike="noStrike" kern="1200" cap="none" spc="0" normalizeH="0" baseline="0" noProof="0" dirty="0">
+                <a:ln>
+                  <a:noFill/>
+                </a:ln>
+                <a:solidFill>
+                  <a:prstClr val="black">
+                    <a:lumMod val="75000"/>
+                    <a:lumOff val="25000"/>
+                  </a:prstClr>
+                </a:solidFill>
+                <a:effectLst/>
+                <a:uLnTx/>
+                <a:uFillTx/>
+                <a:latin typeface="Roboto" panose="020B0604020202020204" charset="0"/>
+                <a:ea typeface="Roboto" panose="020B0604020202020204" charset="0"/>
+                <a:cs typeface="+mn-cs"/>
+              </a:rPr>
+              <a:t>Random Int Generator</a:t>
+            </a:r>
+          </a:p>
+        </p:txBody>
+      </p:sp>
+      <p:sp>
+        <p:nvSpPr>
+          <p:cNvPr id="14" name="Rectangle 13">
+            <a:extLst>
+              <a:ext uri="{FF2B5EF4-FFF2-40B4-BE49-F238E27FC236}">
+                <a16:creationId xmlns:a16="http://schemas.microsoft.com/office/drawing/2014/main" id="{6C29945D-C231-48E8-9866-E0C1ABB75CFB}"/>
+              </a:ext>
+            </a:extLst>
+          </p:cNvPr>
+          <p:cNvSpPr/>
+          <p:nvPr/>
+        </p:nvSpPr>
+        <p:spPr>
+          <a:xfrm>
+            <a:off x="4932374" y="1906504"/>
+            <a:ext cx="1779710" cy="1244376"/>
+          </a:xfrm>
+          <a:prstGeom prst="rect">
+            <a:avLst/>
+          </a:prstGeom>
+          <a:solidFill>
+            <a:schemeClr val="accent5">
+              <a:lumMod val="20000"/>
+              <a:lumOff val="80000"/>
+            </a:schemeClr>
+          </a:solidFill>
+          <a:ln w="28575" cap="flat" cmpd="sng" algn="ctr">
+            <a:solidFill>
+              <a:schemeClr val="tx2"/>
+            </a:solidFill>
+            <a:prstDash val="solid"/>
+            <a:miter lim="800000"/>
+          </a:ln>
+          <a:effectLst/>
+        </p:spPr>
+        <p:txBody>
+          <a:bodyPr rtlCol="0" anchor="ctr"/>
+          <a:lstStyle>
+            <a:defPPr marR="0" lvl="0" algn="l" rtl="0">
+              <a:lnSpc>
+                <a:spcPct val="100000"/>
+              </a:lnSpc>
+              <a:spcBef>
+                <a:spcPts val="0"/>
+              </a:spcBef>
+              <a:spcAft>
+                <a:spcPts val="0"/>
+              </a:spcAft>
+            </a:defPPr>
+            <a:lvl1pPr marR="0" lvl="0" algn="l" rtl="0">
+              <a:lnSpc>
+                <a:spcPct val="100000"/>
+              </a:lnSpc>
+              <a:spcBef>
+                <a:spcPts val="0"/>
+              </a:spcBef>
+              <a:spcAft>
+                <a:spcPts val="0"/>
+              </a:spcAft>
+              <a:buClr>
+                <a:srgbClr val="000000"/>
+              </a:buClr>
+              <a:buFont typeface="Arial"/>
+              <a:defRPr sz="1400" b="0" i="0" u="none" strike="noStrike" cap="none">
+                <a:solidFill>
+                  <a:srgbClr val="000000"/>
+                </a:solidFill>
+                <a:latin typeface="Arial"/>
+                <a:ea typeface="Arial"/>
+                <a:cs typeface="Arial"/>
+                <a:sym typeface="Arial"/>
+              </a:defRPr>
+            </a:lvl1pPr>
+            <a:lvl2pPr marR="0" lvl="1" algn="l" rtl="0">
+              <a:lnSpc>
+                <a:spcPct val="100000"/>
+              </a:lnSpc>
+              <a:spcBef>
+                <a:spcPts val="0"/>
+              </a:spcBef>
+              <a:spcAft>
+                <a:spcPts val="0"/>
+              </a:spcAft>
+              <a:buClr>
+                <a:srgbClr val="000000"/>
+              </a:buClr>
+              <a:buFont typeface="Arial"/>
+              <a:defRPr sz="1400" b="0" i="0" u="none" strike="noStrike" cap="none">
+                <a:solidFill>
+                  <a:srgbClr val="000000"/>
+                </a:solidFill>
+                <a:latin typeface="Arial"/>
+                <a:ea typeface="Arial"/>
+                <a:cs typeface="Arial"/>
+                <a:sym typeface="Arial"/>
+              </a:defRPr>
+            </a:lvl2pPr>
+            <a:lvl3pPr marR="0" lvl="2" algn="l" rtl="0">
+              <a:lnSpc>
+                <a:spcPct val="100000"/>
+              </a:lnSpc>
+              <a:spcBef>
+                <a:spcPts val="0"/>
+              </a:spcBef>
+              <a:spcAft>
+                <a:spcPts val="0"/>
+              </a:spcAft>
+              <a:buClr>
+                <a:srgbClr val="000000"/>
+              </a:buClr>
+              <a:buFont typeface="Arial"/>
+              <a:defRPr sz="1400" b="0" i="0" u="none" strike="noStrike" cap="none">
+                <a:solidFill>
+                  <a:srgbClr val="000000"/>
+                </a:solidFill>
+                <a:latin typeface="Arial"/>
+                <a:ea typeface="Arial"/>
+                <a:cs typeface="Arial"/>
+                <a:sym typeface="Arial"/>
+              </a:defRPr>
+            </a:lvl3pPr>
+            <a:lvl4pPr marR="0" lvl="3" algn="l" rtl="0">
+              <a:lnSpc>
+                <a:spcPct val="100000"/>
+              </a:lnSpc>
+              <a:spcBef>
+                <a:spcPts val="0"/>
+              </a:spcBef>
+              <a:spcAft>
+                <a:spcPts val="0"/>
+              </a:spcAft>
+              <a:buClr>
+                <a:srgbClr val="000000"/>
+              </a:buClr>
+              <a:buFont typeface="Arial"/>
+              <a:defRPr sz="1400" b="0" i="0" u="none" strike="noStrike" cap="none">
+                <a:solidFill>
+                  <a:srgbClr val="000000"/>
+                </a:solidFill>
+                <a:latin typeface="Arial"/>
+                <a:ea typeface="Arial"/>
+                <a:cs typeface="Arial"/>
+                <a:sym typeface="Arial"/>
+              </a:defRPr>
+            </a:lvl4pPr>
+            <a:lvl5pPr marR="0" lvl="4" algn="l" rtl="0">
+              <a:lnSpc>
+                <a:spcPct val="100000"/>
+              </a:lnSpc>
+              <a:spcBef>
+                <a:spcPts val="0"/>
+              </a:spcBef>
+              <a:spcAft>
+                <a:spcPts val="0"/>
+              </a:spcAft>
+              <a:buClr>
+                <a:srgbClr val="000000"/>
+              </a:buClr>
+              <a:buFont typeface="Arial"/>
+              <a:defRPr sz="1400" b="0" i="0" u="none" strike="noStrike" cap="none">
+                <a:solidFill>
+                  <a:srgbClr val="000000"/>
+                </a:solidFill>
+                <a:latin typeface="Arial"/>
+                <a:ea typeface="Arial"/>
+                <a:cs typeface="Arial"/>
+                <a:sym typeface="Arial"/>
+              </a:defRPr>
+            </a:lvl5pPr>
+            <a:lvl6pPr marR="0" lvl="5" algn="l" rtl="0">
+              <a:lnSpc>
+                <a:spcPct val="100000"/>
+              </a:lnSpc>
+              <a:spcBef>
+                <a:spcPts val="0"/>
+              </a:spcBef>
+              <a:spcAft>
+                <a:spcPts val="0"/>
+              </a:spcAft>
+              <a:buClr>
+                <a:srgbClr val="000000"/>
+              </a:buClr>
+              <a:buFont typeface="Arial"/>
+              <a:defRPr sz="1400" b="0" i="0" u="none" strike="noStrike" cap="none">
+                <a:solidFill>
+                  <a:srgbClr val="000000"/>
+                </a:solidFill>
+                <a:latin typeface="Arial"/>
+                <a:ea typeface="Arial"/>
+                <a:cs typeface="Arial"/>
+                <a:sym typeface="Arial"/>
+              </a:defRPr>
+            </a:lvl6pPr>
+            <a:lvl7pPr marR="0" lvl="6" algn="l" rtl="0">
+              <a:lnSpc>
+                <a:spcPct val="100000"/>
+              </a:lnSpc>
+              <a:spcBef>
+                <a:spcPts val="0"/>
+              </a:spcBef>
+              <a:spcAft>
+                <a:spcPts val="0"/>
+              </a:spcAft>
+              <a:buClr>
+                <a:srgbClr val="000000"/>
+              </a:buClr>
+              <a:buFont typeface="Arial"/>
+              <a:defRPr sz="1400" b="0" i="0" u="none" strike="noStrike" cap="none">
+                <a:solidFill>
+                  <a:srgbClr val="000000"/>
+                </a:solidFill>
+                <a:latin typeface="Arial"/>
+                <a:ea typeface="Arial"/>
+                <a:cs typeface="Arial"/>
+                <a:sym typeface="Arial"/>
+              </a:defRPr>
+            </a:lvl7pPr>
+            <a:lvl8pPr marR="0" lvl="7" algn="l" rtl="0">
+              <a:lnSpc>
+                <a:spcPct val="100000"/>
+              </a:lnSpc>
+              <a:spcBef>
+                <a:spcPts val="0"/>
+              </a:spcBef>
+              <a:spcAft>
+                <a:spcPts val="0"/>
+              </a:spcAft>
+              <a:buClr>
+                <a:srgbClr val="000000"/>
+              </a:buClr>
+              <a:buFont typeface="Arial"/>
+              <a:defRPr sz="1400" b="0" i="0" u="none" strike="noStrike" cap="none">
+                <a:solidFill>
+                  <a:srgbClr val="000000"/>
+                </a:solidFill>
+                <a:latin typeface="Arial"/>
+                <a:ea typeface="Arial"/>
+                <a:cs typeface="Arial"/>
+                <a:sym typeface="Arial"/>
+              </a:defRPr>
+            </a:lvl8pPr>
+            <a:lvl9pPr marR="0" lvl="8" algn="l" rtl="0">
+              <a:lnSpc>
+                <a:spcPct val="100000"/>
+              </a:lnSpc>
+              <a:spcBef>
+                <a:spcPts val="0"/>
+              </a:spcBef>
+              <a:spcAft>
+                <a:spcPts val="0"/>
+              </a:spcAft>
+              <a:buClr>
+                <a:srgbClr val="000000"/>
+              </a:buClr>
+              <a:buFont typeface="Arial"/>
+              <a:defRPr sz="1400" b="0" i="0" u="none" strike="noStrike" cap="none">
+                <a:solidFill>
+                  <a:srgbClr val="000000"/>
+                </a:solidFill>
+                <a:latin typeface="Arial"/>
+                <a:ea typeface="Arial"/>
+                <a:cs typeface="Arial"/>
+                <a:sym typeface="Arial"/>
+              </a:defRPr>
+            </a:lvl9pPr>
+          </a:lstStyle>
+          <a:p>
+            <a:pPr marL="0" marR="0" lvl="0" indent="0" algn="ctr" defTabSz="457200" eaLnBrk="1" fontAlgn="auto" latinLnBrk="0" hangingPunct="1">
+              <a:lnSpc>
+                <a:spcPct val="100000"/>
+              </a:lnSpc>
+              <a:spcBef>
+                <a:spcPts val="0"/>
+              </a:spcBef>
+              <a:spcAft>
+                <a:spcPts val="0"/>
+              </a:spcAft>
+              <a:buClrTx/>
+              <a:buSzTx/>
+              <a:buFontTx/>
+              <a:buNone/>
+              <a:tabLst/>
+              <a:defRPr/>
+            </a:pPr>
+            <a:r>
+              <a:rPr lang="en-US" sz="2000" b="1" dirty="0">
+                <a:solidFill>
+                  <a:prstClr val="black">
+                    <a:lumMod val="75000"/>
+                    <a:lumOff val="25000"/>
+                  </a:prstClr>
+                </a:solidFill>
+                <a:latin typeface="Roboto" panose="020B0604020202020204" charset="0"/>
+                <a:ea typeface="Roboto" panose="020B0604020202020204" charset="0"/>
+                <a:cs typeface="+mn-cs"/>
+              </a:rPr>
+              <a:t>f</a:t>
+            </a:r>
+            <a:r>
+              <a:rPr kumimoji="0" lang="en-US" sz="2000" b="1" i="0" u="none" strike="noStrike" kern="1200" cap="none" spc="0" normalizeH="0" baseline="0" noProof="0" dirty="0">
+                <a:ln>
+                  <a:noFill/>
+                </a:ln>
+                <a:solidFill>
+                  <a:prstClr val="black">
+                    <a:lumMod val="75000"/>
+                    <a:lumOff val="25000"/>
+                  </a:prstClr>
+                </a:solidFill>
+                <a:effectLst/>
+                <a:uLnTx/>
+                <a:uFillTx/>
+                <a:latin typeface="Roboto" panose="020B0604020202020204" charset="0"/>
+                <a:ea typeface="Roboto" panose="020B0604020202020204" charset="0"/>
+                <a:cs typeface="+mn-cs"/>
+              </a:rPr>
+              <a:t>(x) = x</a:t>
+            </a:r>
+            <a:r>
+              <a:rPr kumimoji="0" lang="en-US" sz="2000" b="1" i="0" u="none" strike="noStrike" kern="1200" cap="none" spc="0" normalizeH="0" baseline="30000" noProof="0" dirty="0">
+                <a:ln>
+                  <a:noFill/>
+                </a:ln>
+                <a:solidFill>
+                  <a:prstClr val="black">
+                    <a:lumMod val="75000"/>
+                    <a:lumOff val="25000"/>
+                  </a:prstClr>
+                </a:solidFill>
+                <a:effectLst/>
+                <a:uLnTx/>
+                <a:uFillTx/>
+                <a:latin typeface="Roboto" panose="020B0604020202020204" charset="0"/>
+                <a:ea typeface="Roboto" panose="020B0604020202020204" charset="0"/>
+                <a:cs typeface="+mn-cs"/>
+              </a:rPr>
+              <a:t>2</a:t>
+            </a:r>
+            <a:endParaRPr kumimoji="0" lang="en-US" sz="2000" b="1" i="0" u="none" strike="noStrike" kern="1200" cap="none" spc="0" normalizeH="0" baseline="0" noProof="0" dirty="0">
+              <a:ln>
+                <a:noFill/>
+              </a:ln>
+              <a:solidFill>
+                <a:prstClr val="black">
+                  <a:lumMod val="75000"/>
+                  <a:lumOff val="25000"/>
+                </a:prstClr>
+              </a:solidFill>
+              <a:effectLst/>
+              <a:uLnTx/>
+              <a:uFillTx/>
+              <a:latin typeface="Roboto" panose="020B0604020202020204" charset="0"/>
+              <a:ea typeface="Roboto" panose="020B0604020202020204" charset="0"/>
+              <a:cs typeface="+mn-cs"/>
+            </a:endParaRPr>
+          </a:p>
+        </p:txBody>
+      </p:sp>
+      <p:sp>
+        <p:nvSpPr>
+          <p:cNvPr id="15" name="Rectangle 14">
+            <a:extLst>
+              <a:ext uri="{FF2B5EF4-FFF2-40B4-BE49-F238E27FC236}">
+                <a16:creationId xmlns:a16="http://schemas.microsoft.com/office/drawing/2014/main" id="{58E39E4B-DAB7-4D29-BFB2-ED07860C2D4C}"/>
+              </a:ext>
+            </a:extLst>
+          </p:cNvPr>
+          <p:cNvSpPr/>
+          <p:nvPr/>
+        </p:nvSpPr>
+        <p:spPr>
+          <a:xfrm>
+            <a:off x="8051489" y="1906504"/>
+            <a:ext cx="1779710" cy="1244376"/>
+          </a:xfrm>
+          <a:prstGeom prst="rect">
+            <a:avLst/>
+          </a:prstGeom>
+          <a:solidFill>
+            <a:schemeClr val="accent5">
+              <a:lumMod val="20000"/>
+              <a:lumOff val="80000"/>
+            </a:schemeClr>
+          </a:solidFill>
+          <a:ln w="28575" cap="flat" cmpd="sng" algn="ctr">
+            <a:solidFill>
+              <a:schemeClr val="tx2"/>
+            </a:solidFill>
+            <a:prstDash val="solid"/>
+            <a:miter lim="800000"/>
+          </a:ln>
+          <a:effectLst/>
+        </p:spPr>
+        <p:txBody>
+          <a:bodyPr rtlCol="0" anchor="ctr"/>
+          <a:lstStyle>
+            <a:defPPr marR="0" lvl="0" algn="l" rtl="0">
+              <a:lnSpc>
+                <a:spcPct val="100000"/>
+              </a:lnSpc>
+              <a:spcBef>
+                <a:spcPts val="0"/>
+              </a:spcBef>
+              <a:spcAft>
+                <a:spcPts val="0"/>
+              </a:spcAft>
+            </a:defPPr>
+            <a:lvl1pPr marR="0" lvl="0" algn="l" rtl="0">
+              <a:lnSpc>
+                <a:spcPct val="100000"/>
+              </a:lnSpc>
+              <a:spcBef>
+                <a:spcPts val="0"/>
+              </a:spcBef>
+              <a:spcAft>
+                <a:spcPts val="0"/>
+              </a:spcAft>
+              <a:buClr>
+                <a:srgbClr val="000000"/>
+              </a:buClr>
+              <a:buFont typeface="Arial"/>
+              <a:defRPr sz="1400" b="0" i="0" u="none" strike="noStrike" cap="none">
+                <a:solidFill>
+                  <a:srgbClr val="000000"/>
+                </a:solidFill>
+                <a:latin typeface="Arial"/>
+                <a:ea typeface="Arial"/>
+                <a:cs typeface="Arial"/>
+                <a:sym typeface="Arial"/>
+              </a:defRPr>
+            </a:lvl1pPr>
+            <a:lvl2pPr marR="0" lvl="1" algn="l" rtl="0">
+              <a:lnSpc>
+                <a:spcPct val="100000"/>
+              </a:lnSpc>
+              <a:spcBef>
+                <a:spcPts val="0"/>
+              </a:spcBef>
+              <a:spcAft>
+                <a:spcPts val="0"/>
+              </a:spcAft>
+              <a:buClr>
+                <a:srgbClr val="000000"/>
+              </a:buClr>
+              <a:buFont typeface="Arial"/>
+              <a:defRPr sz="1400" b="0" i="0" u="none" strike="noStrike" cap="none">
+                <a:solidFill>
+                  <a:srgbClr val="000000"/>
+                </a:solidFill>
+                <a:latin typeface="Arial"/>
+                <a:ea typeface="Arial"/>
+                <a:cs typeface="Arial"/>
+                <a:sym typeface="Arial"/>
+              </a:defRPr>
+            </a:lvl2pPr>
+            <a:lvl3pPr marR="0" lvl="2" algn="l" rtl="0">
+              <a:lnSpc>
+                <a:spcPct val="100000"/>
+              </a:lnSpc>
+              <a:spcBef>
+                <a:spcPts val="0"/>
+              </a:spcBef>
+              <a:spcAft>
+                <a:spcPts val="0"/>
+              </a:spcAft>
+              <a:buClr>
+                <a:srgbClr val="000000"/>
+              </a:buClr>
+              <a:buFont typeface="Arial"/>
+              <a:defRPr sz="1400" b="0" i="0" u="none" strike="noStrike" cap="none">
+                <a:solidFill>
+                  <a:srgbClr val="000000"/>
+                </a:solidFill>
+                <a:latin typeface="Arial"/>
+                <a:ea typeface="Arial"/>
+                <a:cs typeface="Arial"/>
+                <a:sym typeface="Arial"/>
+              </a:defRPr>
+            </a:lvl3pPr>
+            <a:lvl4pPr marR="0" lvl="3" algn="l" rtl="0">
+              <a:lnSpc>
+                <a:spcPct val="100000"/>
+              </a:lnSpc>
+              <a:spcBef>
+                <a:spcPts val="0"/>
+              </a:spcBef>
+              <a:spcAft>
+                <a:spcPts val="0"/>
+              </a:spcAft>
+              <a:buClr>
+                <a:srgbClr val="000000"/>
+              </a:buClr>
+              <a:buFont typeface="Arial"/>
+              <a:defRPr sz="1400" b="0" i="0" u="none" strike="noStrike" cap="none">
+                <a:solidFill>
+                  <a:srgbClr val="000000"/>
+                </a:solidFill>
+                <a:latin typeface="Arial"/>
+                <a:ea typeface="Arial"/>
+                <a:cs typeface="Arial"/>
+                <a:sym typeface="Arial"/>
+              </a:defRPr>
+            </a:lvl4pPr>
+            <a:lvl5pPr marR="0" lvl="4" algn="l" rtl="0">
+              <a:lnSpc>
+                <a:spcPct val="100000"/>
+              </a:lnSpc>
+              <a:spcBef>
+                <a:spcPts val="0"/>
+              </a:spcBef>
+              <a:spcAft>
+                <a:spcPts val="0"/>
+              </a:spcAft>
+              <a:buClr>
+                <a:srgbClr val="000000"/>
+              </a:buClr>
+              <a:buFont typeface="Arial"/>
+              <a:defRPr sz="1400" b="0" i="0" u="none" strike="noStrike" cap="none">
+                <a:solidFill>
+                  <a:srgbClr val="000000"/>
+                </a:solidFill>
+                <a:latin typeface="Arial"/>
+                <a:ea typeface="Arial"/>
+                <a:cs typeface="Arial"/>
+                <a:sym typeface="Arial"/>
+              </a:defRPr>
+            </a:lvl5pPr>
+            <a:lvl6pPr marR="0" lvl="5" algn="l" rtl="0">
+              <a:lnSpc>
+                <a:spcPct val="100000"/>
+              </a:lnSpc>
+              <a:spcBef>
+                <a:spcPts val="0"/>
+              </a:spcBef>
+              <a:spcAft>
+                <a:spcPts val="0"/>
+              </a:spcAft>
+              <a:buClr>
+                <a:srgbClr val="000000"/>
+              </a:buClr>
+              <a:buFont typeface="Arial"/>
+              <a:defRPr sz="1400" b="0" i="0" u="none" strike="noStrike" cap="none">
+                <a:solidFill>
+                  <a:srgbClr val="000000"/>
+                </a:solidFill>
+                <a:latin typeface="Arial"/>
+                <a:ea typeface="Arial"/>
+                <a:cs typeface="Arial"/>
+                <a:sym typeface="Arial"/>
+              </a:defRPr>
+            </a:lvl6pPr>
+            <a:lvl7pPr marR="0" lvl="6" algn="l" rtl="0">
+              <a:lnSpc>
+                <a:spcPct val="100000"/>
+              </a:lnSpc>
+              <a:spcBef>
+                <a:spcPts val="0"/>
+              </a:spcBef>
+              <a:spcAft>
+                <a:spcPts val="0"/>
+              </a:spcAft>
+              <a:buClr>
+                <a:srgbClr val="000000"/>
+              </a:buClr>
+              <a:buFont typeface="Arial"/>
+              <a:defRPr sz="1400" b="0" i="0" u="none" strike="noStrike" cap="none">
+                <a:solidFill>
+                  <a:srgbClr val="000000"/>
+                </a:solidFill>
+                <a:latin typeface="Arial"/>
+                <a:ea typeface="Arial"/>
+                <a:cs typeface="Arial"/>
+                <a:sym typeface="Arial"/>
+              </a:defRPr>
+            </a:lvl7pPr>
+            <a:lvl8pPr marR="0" lvl="7" algn="l" rtl="0">
+              <a:lnSpc>
+                <a:spcPct val="100000"/>
+              </a:lnSpc>
+              <a:spcBef>
+                <a:spcPts val="0"/>
+              </a:spcBef>
+              <a:spcAft>
+                <a:spcPts val="0"/>
+              </a:spcAft>
+              <a:buClr>
+                <a:srgbClr val="000000"/>
+              </a:buClr>
+              <a:buFont typeface="Arial"/>
+              <a:defRPr sz="1400" b="0" i="0" u="none" strike="noStrike" cap="none">
+                <a:solidFill>
+                  <a:srgbClr val="000000"/>
+                </a:solidFill>
+                <a:latin typeface="Arial"/>
+                <a:ea typeface="Arial"/>
+                <a:cs typeface="Arial"/>
+                <a:sym typeface="Arial"/>
+              </a:defRPr>
+            </a:lvl8pPr>
+            <a:lvl9pPr marR="0" lvl="8" algn="l" rtl="0">
+              <a:lnSpc>
+                <a:spcPct val="100000"/>
+              </a:lnSpc>
+              <a:spcBef>
+                <a:spcPts val="0"/>
+              </a:spcBef>
+              <a:spcAft>
+                <a:spcPts val="0"/>
+              </a:spcAft>
+              <a:buClr>
+                <a:srgbClr val="000000"/>
+              </a:buClr>
+              <a:buFont typeface="Arial"/>
+              <a:defRPr sz="1400" b="0" i="0" u="none" strike="noStrike" cap="none">
+                <a:solidFill>
+                  <a:srgbClr val="000000"/>
+                </a:solidFill>
+                <a:latin typeface="Arial"/>
+                <a:ea typeface="Arial"/>
+                <a:cs typeface="Arial"/>
+                <a:sym typeface="Arial"/>
+              </a:defRPr>
+            </a:lvl9pPr>
+          </a:lstStyle>
+          <a:p>
+            <a:pPr marL="0" marR="0" lvl="0" indent="0" algn="ctr" defTabSz="457200" eaLnBrk="1" fontAlgn="auto" latinLnBrk="0" hangingPunct="1">
+              <a:lnSpc>
+                <a:spcPct val="100000"/>
+              </a:lnSpc>
+              <a:spcBef>
+                <a:spcPts val="0"/>
+              </a:spcBef>
+              <a:spcAft>
+                <a:spcPts val="0"/>
+              </a:spcAft>
+              <a:buClrTx/>
+              <a:buSzTx/>
+              <a:buFontTx/>
+              <a:buNone/>
+              <a:tabLst/>
+              <a:defRPr/>
+            </a:pPr>
+            <a:r>
+              <a:rPr kumimoji="0" lang="en-US" sz="2000" b="1" i="0" u="none" strike="noStrike" kern="1200" cap="none" spc="0" normalizeH="0" baseline="0" noProof="0" dirty="0">
+                <a:ln>
+                  <a:noFill/>
+                </a:ln>
+                <a:solidFill>
+                  <a:prstClr val="black">
+                    <a:lumMod val="75000"/>
+                    <a:lumOff val="25000"/>
+                  </a:prstClr>
+                </a:solidFill>
+                <a:effectLst/>
+                <a:uLnTx/>
+                <a:uFillTx/>
+                <a:latin typeface="Roboto" panose="020B0604020202020204" charset="0"/>
+                <a:ea typeface="Roboto" panose="020B0604020202020204" charset="0"/>
+                <a:cs typeface="+mn-cs"/>
+              </a:rPr>
+              <a:t>Write to DB</a:t>
+            </a:r>
           </a:p>
         </p:txBody>
       </p:sp>
@@ -5337,6 +6445,35 @@
           </a:prstGeom>
         </p:spPr>
       </p:pic>
+      <p:sp>
+        <p:nvSpPr>
+          <p:cNvPr id="3" name="Slide Number Placeholder 2">
+            <a:extLst>
+              <a:ext uri="{FF2B5EF4-FFF2-40B4-BE49-F238E27FC236}">
+                <a16:creationId xmlns:a16="http://schemas.microsoft.com/office/drawing/2014/main" id="{16728545-9C7A-4055-B70D-D82906A91B71}"/>
+              </a:ext>
+            </a:extLst>
+          </p:cNvPr>
+          <p:cNvSpPr>
+            <a:spLocks noGrp="1"/>
+          </p:cNvSpPr>
+          <p:nvPr>
+            <p:ph type="sldNum" sz="quarter" idx="12"/>
+          </p:nvPr>
+        </p:nvSpPr>
+        <p:spPr/>
+        <p:txBody>
+          <a:bodyPr/>
+          <a:lstStyle/>
+          <a:p>
+            <a:fld id="{298EC0E5-27BB-4B98-A049-4ABBDEC963D6}" type="slidenum">
+              <a:rPr lang="en-US" smtClean="0"/>
+              <a:t>2</a:t>
+            </a:fld>
+            <a:endParaRPr lang="en-US"/>
+          </a:p>
+        </p:txBody>
+      </p:sp>
     </p:spTree>
     <p:extLst>
       <p:ext uri="{BB962C8B-B14F-4D97-AF65-F5344CB8AC3E}">
@@ -6891,6 +8028,35 @@
           </a:p>
         </p:txBody>
       </p:sp>
+      <p:sp>
+        <p:nvSpPr>
+          <p:cNvPr id="6" name="Slide Number Placeholder 5">
+            <a:extLst>
+              <a:ext uri="{FF2B5EF4-FFF2-40B4-BE49-F238E27FC236}">
+                <a16:creationId xmlns:a16="http://schemas.microsoft.com/office/drawing/2014/main" id="{2697E387-6CEE-4131-86F9-82415D0910BE}"/>
+              </a:ext>
+            </a:extLst>
+          </p:cNvPr>
+          <p:cNvSpPr>
+            <a:spLocks noGrp="1"/>
+          </p:cNvSpPr>
+          <p:nvPr>
+            <p:ph type="sldNum" sz="quarter" idx="12"/>
+          </p:nvPr>
+        </p:nvSpPr>
+        <p:spPr/>
+        <p:txBody>
+          <a:bodyPr/>
+          <a:lstStyle/>
+          <a:p>
+            <a:fld id="{298EC0E5-27BB-4B98-A049-4ABBDEC963D6}" type="slidenum">
+              <a:rPr lang="en-US" smtClean="0"/>
+              <a:t>3</a:t>
+            </a:fld>
+            <a:endParaRPr lang="en-US"/>
+          </a:p>
+        </p:txBody>
+      </p:sp>
     </p:spTree>
     <p:extLst>
       <p:ext uri="{BB962C8B-B14F-4D97-AF65-F5344CB8AC3E}">
@@ -8115,6 +9281,35 @@
               <a:t>Monolithic Program</a:t>
             </a:r>
             <a:endParaRPr lang="en-US" dirty="0"/>
+          </a:p>
+        </p:txBody>
+      </p:sp>
+      <p:sp>
+        <p:nvSpPr>
+          <p:cNvPr id="3" name="Slide Number Placeholder 2">
+            <a:extLst>
+              <a:ext uri="{FF2B5EF4-FFF2-40B4-BE49-F238E27FC236}">
+                <a16:creationId xmlns:a16="http://schemas.microsoft.com/office/drawing/2014/main" id="{2E5D4339-ACF3-434A-92A5-F3C84501B7FB}"/>
+              </a:ext>
+            </a:extLst>
+          </p:cNvPr>
+          <p:cNvSpPr>
+            <a:spLocks noGrp="1"/>
+          </p:cNvSpPr>
+          <p:nvPr>
+            <p:ph type="sldNum" sz="quarter" idx="12"/>
+          </p:nvPr>
+        </p:nvSpPr>
+        <p:spPr/>
+        <p:txBody>
+          <a:bodyPr/>
+          <a:lstStyle/>
+          <a:p>
+            <a:fld id="{298EC0E5-27BB-4B98-A049-4ABBDEC963D6}" type="slidenum">
+              <a:rPr lang="en-US" smtClean="0"/>
+              <a:t>4</a:t>
+            </a:fld>
+            <a:endParaRPr lang="en-US"/>
           </a:p>
         </p:txBody>
       </p:sp>
@@ -10224,6 +11419,35 @@
           </a:p>
         </p:txBody>
       </p:sp>
+      <p:sp>
+        <p:nvSpPr>
+          <p:cNvPr id="3" name="Slide Number Placeholder 2">
+            <a:extLst>
+              <a:ext uri="{FF2B5EF4-FFF2-40B4-BE49-F238E27FC236}">
+                <a16:creationId xmlns:a16="http://schemas.microsoft.com/office/drawing/2014/main" id="{4629047C-B592-4138-8D8F-E8CF106FDF7C}"/>
+              </a:ext>
+            </a:extLst>
+          </p:cNvPr>
+          <p:cNvSpPr>
+            <a:spLocks noGrp="1"/>
+          </p:cNvSpPr>
+          <p:nvPr>
+            <p:ph type="sldNum" sz="quarter" idx="12"/>
+          </p:nvPr>
+        </p:nvSpPr>
+        <p:spPr/>
+        <p:txBody>
+          <a:bodyPr/>
+          <a:lstStyle/>
+          <a:p>
+            <a:fld id="{298EC0E5-27BB-4B98-A049-4ABBDEC963D6}" type="slidenum">
+              <a:rPr lang="en-US" smtClean="0"/>
+              <a:t>5</a:t>
+            </a:fld>
+            <a:endParaRPr lang="en-US"/>
+          </a:p>
+        </p:txBody>
+      </p:sp>
     </p:spTree>
     <p:extLst>
       <p:ext uri="{BB962C8B-B14F-4D97-AF65-F5344CB8AC3E}">
@@ -11128,6 +12352,35 @@
           </a:p>
         </p:txBody>
       </p:sp>
+      <p:sp>
+        <p:nvSpPr>
+          <p:cNvPr id="3" name="Slide Number Placeholder 2">
+            <a:extLst>
+              <a:ext uri="{FF2B5EF4-FFF2-40B4-BE49-F238E27FC236}">
+                <a16:creationId xmlns:a16="http://schemas.microsoft.com/office/drawing/2014/main" id="{E30042D5-27D3-4A18-9A06-48837FAF3628}"/>
+              </a:ext>
+            </a:extLst>
+          </p:cNvPr>
+          <p:cNvSpPr>
+            <a:spLocks noGrp="1"/>
+          </p:cNvSpPr>
+          <p:nvPr>
+            <p:ph type="sldNum" sz="quarter" idx="12"/>
+          </p:nvPr>
+        </p:nvSpPr>
+        <p:spPr/>
+        <p:txBody>
+          <a:bodyPr/>
+          <a:lstStyle/>
+          <a:p>
+            <a:fld id="{298EC0E5-27BB-4B98-A049-4ABBDEC963D6}" type="slidenum">
+              <a:rPr lang="en-US" smtClean="0"/>
+              <a:t>6</a:t>
+            </a:fld>
+            <a:endParaRPr lang="en-US"/>
+          </a:p>
+        </p:txBody>
+      </p:sp>
     </p:spTree>
     <p:extLst>
       <p:ext uri="{BB962C8B-B14F-4D97-AF65-F5344CB8AC3E}">
@@ -13053,6 +14306,35 @@
           <a:lstStyle/>
           <a:p>
             <a:pPr algn="ctr"/>
+            <a:endParaRPr lang="en-US"/>
+          </a:p>
+        </p:txBody>
+      </p:sp>
+      <p:sp>
+        <p:nvSpPr>
+          <p:cNvPr id="3" name="Slide Number Placeholder 2">
+            <a:extLst>
+              <a:ext uri="{FF2B5EF4-FFF2-40B4-BE49-F238E27FC236}">
+                <a16:creationId xmlns:a16="http://schemas.microsoft.com/office/drawing/2014/main" id="{618467D8-2D63-4928-A417-4822E93DFE7A}"/>
+              </a:ext>
+            </a:extLst>
+          </p:cNvPr>
+          <p:cNvSpPr>
+            <a:spLocks noGrp="1"/>
+          </p:cNvSpPr>
+          <p:nvPr>
+            <p:ph type="sldNum" sz="quarter" idx="12"/>
+          </p:nvPr>
+        </p:nvSpPr>
+        <p:spPr/>
+        <p:txBody>
+          <a:bodyPr/>
+          <a:lstStyle/>
+          <a:p>
+            <a:fld id="{298EC0E5-27BB-4B98-A049-4ABBDEC963D6}" type="slidenum">
+              <a:rPr lang="en-US" smtClean="0"/>
+              <a:t>7</a:t>
+            </a:fld>
             <a:endParaRPr lang="en-US"/>
           </a:p>
         </p:txBody>
@@ -19359,6 +20641,35 @@
           </a:p>
         </p:txBody>
       </p:sp>
+      <p:sp>
+        <p:nvSpPr>
+          <p:cNvPr id="3" name="Slide Number Placeholder 2">
+            <a:extLst>
+              <a:ext uri="{FF2B5EF4-FFF2-40B4-BE49-F238E27FC236}">
+                <a16:creationId xmlns:a16="http://schemas.microsoft.com/office/drawing/2014/main" id="{B0386510-4973-400D-8A0D-61F61A3E108C}"/>
+              </a:ext>
+            </a:extLst>
+          </p:cNvPr>
+          <p:cNvSpPr>
+            <a:spLocks noGrp="1"/>
+          </p:cNvSpPr>
+          <p:nvPr>
+            <p:ph type="sldNum" sz="quarter" idx="12"/>
+          </p:nvPr>
+        </p:nvSpPr>
+        <p:spPr/>
+        <p:txBody>
+          <a:bodyPr/>
+          <a:lstStyle/>
+          <a:p>
+            <a:fld id="{298EC0E5-27BB-4B98-A049-4ABBDEC963D6}" type="slidenum">
+              <a:rPr lang="en-US" smtClean="0"/>
+              <a:t>8</a:t>
+            </a:fld>
+            <a:endParaRPr lang="en-US"/>
+          </a:p>
+        </p:txBody>
+      </p:sp>
     </p:spTree>
     <p:extLst>
       <p:ext uri="{BB962C8B-B14F-4D97-AF65-F5344CB8AC3E}">
@@ -19526,6 +20837,35 @@
               <a:rPr lang="en-US" dirty="0"/>
               <a:t>.</a:t>
             </a:r>
+          </a:p>
+        </p:txBody>
+      </p:sp>
+      <p:sp>
+        <p:nvSpPr>
+          <p:cNvPr id="4" name="Slide Number Placeholder 3">
+            <a:extLst>
+              <a:ext uri="{FF2B5EF4-FFF2-40B4-BE49-F238E27FC236}">
+                <a16:creationId xmlns:a16="http://schemas.microsoft.com/office/drawing/2014/main" id="{37A4EC05-DB17-4926-AE5A-E4360ADDA7B6}"/>
+              </a:ext>
+            </a:extLst>
+          </p:cNvPr>
+          <p:cNvSpPr>
+            <a:spLocks noGrp="1"/>
+          </p:cNvSpPr>
+          <p:nvPr>
+            <p:ph type="sldNum" sz="quarter" idx="12"/>
+          </p:nvPr>
+        </p:nvSpPr>
+        <p:spPr/>
+        <p:txBody>
+          <a:bodyPr/>
+          <a:lstStyle/>
+          <a:p>
+            <a:fld id="{298EC0E5-27BB-4B98-A049-4ABBDEC963D6}" type="slidenum">
+              <a:rPr lang="en-US" smtClean="0"/>
+              <a:t>9</a:t>
+            </a:fld>
+            <a:endParaRPr lang="en-US"/>
           </a:p>
         </p:txBody>
       </p:sp>

</xml_diff>